<commit_message>
SLAVE e non SLEAVE
</commit_message>
<xml_diff>
--- a/Presentation slides/Presentazione.pptx
+++ b/Presentation slides/Presentazione.pptx
@@ -6805,8 +6805,8 @@
               <a:buNone/>
             </a:pPr>
             <a:r>
-              <a:rPr lang="it-IT" sz="2400" dirty="0" err="1" smtClean="0"/>
-              <a:t>Sleave</a:t>
+              <a:rPr lang="it-IT" sz="2400" dirty="0" smtClean="0"/>
+              <a:t>Slave</a:t>
             </a:r>
             <a:endParaRPr lang="en" sz="2400" dirty="0"/>
           </a:p>
@@ -6848,12 +6848,12 @@
               <a:t>Entrati in </a:t>
             </a:r>
             <a:r>
-              <a:rPr lang="it-IT" sz="1600" dirty="0" err="1" smtClean="0"/>
-              <a:t>sleave</a:t>
-            </a:r>
-            <a:r>
               <a:rPr lang="it-IT" sz="1600" dirty="0" smtClean="0"/>
-              <a:t> mode l’applicazione esegue alcuni semplici passi:</a:t>
+              <a:t>slave </a:t>
+            </a:r>
+            <a:r>
+              <a:rPr lang="it-IT" sz="1600" dirty="0" smtClean="0"/>
+              <a:t>mode l’applicazione esegue alcuni semplici passi:</a:t>
             </a:r>
             <a:endParaRPr lang="en" sz="1600" dirty="0" smtClean="0"/>
           </a:p>
@@ -7238,8 +7238,8 @@
               <a:t> UDP in attesa di eventuali richieste da parte di uno </a:t>
             </a:r>
             <a:r>
-              <a:rPr lang="it-IT" sz="2000" dirty="0" err="1" smtClean="0"/>
-              <a:t>sleave</a:t>
+              <a:rPr lang="it-IT" sz="2000" dirty="0" smtClean="0"/>
+              <a:t>slave</a:t>
             </a:r>
             <a:endParaRPr lang="it-IT" sz="2000" dirty="0" smtClean="0"/>
           </a:p>
@@ -7258,12 +7258,12 @@
               <a:t>Risponde alla richiesta dello </a:t>
             </a:r>
             <a:r>
-              <a:rPr lang="it-IT" sz="2000" dirty="0" err="1" smtClean="0"/>
-              <a:t>sleave</a:t>
-            </a:r>
-            <a:r>
               <a:rPr lang="it-IT" sz="2000" dirty="0" smtClean="0"/>
-              <a:t> comunicando il proprio nome</a:t>
+              <a:t>slave </a:t>
+            </a:r>
+            <a:r>
+              <a:rPr lang="it-IT" sz="2000" dirty="0" smtClean="0"/>
+              <a:t>comunicando il proprio nome</a:t>
             </a:r>
           </a:p>
           <a:p>
@@ -11922,12 +11922,6 @@
               </a:rPr>
               <a:t>	  </a:t>
             </a:r>
-            <a:endParaRPr lang="it-IT" sz="1200" dirty="0" smtClean="0">
-              <a:highlight>
-                <a:srgbClr val="FFFFFF"/>
-              </a:highlight>
-              <a:latin typeface="Courier New" charset="0"/>
-            </a:endParaRPr>
           </a:p>
           <a:p>
             <a:r>
@@ -23394,16 +23388,12 @@
               <a:t>: avvio Master mode e </a:t>
             </a:r>
             <a:r>
-              <a:rPr lang="it-IT" sz="2400" dirty="0" err="1"/>
-              <a:t>S</a:t>
-            </a:r>
-            <a:r>
-              <a:rPr lang="it-IT" sz="2400" dirty="0" err="1" smtClean="0"/>
-              <a:t>leave</a:t>
-            </a:r>
-            <a:r>
               <a:rPr lang="it-IT" sz="2400" dirty="0" smtClean="0"/>
-              <a:t> mode</a:t>
+              <a:t>Slave </a:t>
+            </a:r>
+            <a:r>
+              <a:rPr lang="it-IT" sz="2400" dirty="0" smtClean="0"/>
+              <a:t>mode</a:t>
             </a:r>
             <a:endParaRPr lang="en" sz="2400" dirty="0"/>
           </a:p>
@@ -23473,20 +23463,20 @@
               <a:t>Durante le prove sono state sfruttate le diverse porte utilizzate dalla </a:t>
             </a:r>
             <a:r>
-              <a:rPr lang="it-IT" sz="1600" dirty="0" err="1" smtClean="0">
-                <a:latin typeface="Source Sans Pro" charset="0"/>
-                <a:ea typeface="Source Sans Pro" charset="0"/>
-                <a:cs typeface="Source Sans Pro" charset="0"/>
-              </a:rPr>
-              <a:t>sleave</a:t>
-            </a:r>
-            <a:r>
               <a:rPr lang="it-IT" sz="1600" dirty="0" smtClean="0">
                 <a:latin typeface="Source Sans Pro" charset="0"/>
                 <a:ea typeface="Source Sans Pro" charset="0"/>
                 <a:cs typeface="Source Sans Pro" charset="0"/>
               </a:rPr>
-              <a:t> mode e dalla master mode, è stato possibile testare la correttezza dei risultati semplicemente utilizzando due terminali.</a:t>
+              <a:t>slave </a:t>
+            </a:r>
+            <a:r>
+              <a:rPr lang="it-IT" sz="1600" dirty="0" smtClean="0">
+                <a:latin typeface="Source Sans Pro" charset="0"/>
+                <a:ea typeface="Source Sans Pro" charset="0"/>
+                <a:cs typeface="Source Sans Pro" charset="0"/>
+              </a:rPr>
+              <a:t>mode e dalla master mode, è stato possibile testare la correttezza dei risultati semplicemente utilizzando due terminali.</a:t>
             </a:r>
           </a:p>
         </p:txBody>
@@ -24674,7 +24664,7 @@
         <p:spPr>
           <a:xfrm>
             <a:off x="786150" y="1793101"/>
-            <a:ext cx="6503650" cy="1077218"/>
+            <a:ext cx="6503650" cy="830997"/>
           </a:xfrm>
           <a:prstGeom prst="rect">
             <a:avLst/>
@@ -24693,7 +24683,7 @@
                 <a:ea typeface="Source Sans Pro" charset="0"/>
                 <a:cs typeface="Source Sans Pro" charset="0"/>
               </a:rPr>
-              <a:t>Mentre dal lato master, dopo aver risposto alla richiesta </a:t>
+              <a:t>Mentre dal lato master, dopo aver risposto alla richiesta dello </a:t>
             </a:r>
             <a:r>
               <a:rPr lang="it-IT" sz="1600" dirty="0" smtClean="0">
@@ -24701,7 +24691,15 @@
                 <a:ea typeface="Source Sans Pro" charset="0"/>
                 <a:cs typeface="Source Sans Pro" charset="0"/>
               </a:rPr>
-              <a:t>dello </a:t>
+              <a:t>slave </a:t>
+            </a:r>
+            <a:r>
+              <a:rPr lang="it-IT" sz="1600" dirty="0" smtClean="0">
+                <a:latin typeface="Source Sans Pro" charset="0"/>
+                <a:ea typeface="Source Sans Pro" charset="0"/>
+                <a:cs typeface="Source Sans Pro" charset="0"/>
+              </a:rPr>
+              <a:t>si apre un </a:t>
             </a:r>
             <a:r>
               <a:rPr lang="it-IT" sz="1600" dirty="0" err="1" smtClean="0">
@@ -24709,7 +24707,7 @@
                 <a:ea typeface="Source Sans Pro" charset="0"/>
                 <a:cs typeface="Source Sans Pro" charset="0"/>
               </a:rPr>
-              <a:t>sleave</a:t>
+              <a:t>socket</a:t>
             </a:r>
             <a:r>
               <a:rPr lang="it-IT" sz="1600" dirty="0" smtClean="0">
@@ -24717,7 +24715,7 @@
                 <a:ea typeface="Source Sans Pro" charset="0"/>
                 <a:cs typeface="Source Sans Pro" charset="0"/>
               </a:rPr>
-              <a:t> si </a:t>
+              <a:t> TCP, nel lato </a:t>
             </a:r>
             <a:r>
               <a:rPr lang="it-IT" sz="1600" dirty="0" smtClean="0">
@@ -24725,15 +24723,7 @@
                 <a:ea typeface="Source Sans Pro" charset="0"/>
                 <a:cs typeface="Source Sans Pro" charset="0"/>
               </a:rPr>
-              <a:t>apre un </a:t>
-            </a:r>
-            <a:r>
-              <a:rPr lang="it-IT" sz="1600" dirty="0" err="1" smtClean="0">
-                <a:latin typeface="Source Sans Pro" charset="0"/>
-                <a:ea typeface="Source Sans Pro" charset="0"/>
-                <a:cs typeface="Source Sans Pro" charset="0"/>
-              </a:rPr>
-              <a:t>socket</a:t>
+              <a:t>slave</a:t>
             </a:r>
             <a:r>
               <a:rPr lang="it-IT" sz="1600" dirty="0" smtClean="0">
@@ -24741,55 +24731,7 @@
                 <a:ea typeface="Source Sans Pro" charset="0"/>
                 <a:cs typeface="Source Sans Pro" charset="0"/>
               </a:rPr>
-              <a:t> </a:t>
-            </a:r>
-            <a:r>
-              <a:rPr lang="it-IT" sz="1600" dirty="0" smtClean="0">
-                <a:latin typeface="Source Sans Pro" charset="0"/>
-                <a:ea typeface="Source Sans Pro" charset="0"/>
-                <a:cs typeface="Source Sans Pro" charset="0"/>
-              </a:rPr>
-              <a:t>TCP, nel </a:t>
-            </a:r>
-            <a:r>
-              <a:rPr lang="it-IT" sz="1600" dirty="0" smtClean="0">
-                <a:latin typeface="Source Sans Pro" charset="0"/>
-                <a:ea typeface="Source Sans Pro" charset="0"/>
-                <a:cs typeface="Source Sans Pro" charset="0"/>
-              </a:rPr>
-              <a:t>lato </a:t>
-            </a:r>
-            <a:r>
-              <a:rPr lang="it-IT" sz="1600" dirty="0" err="1" smtClean="0">
-                <a:latin typeface="Source Sans Pro" charset="0"/>
-                <a:ea typeface="Source Sans Pro" charset="0"/>
-                <a:cs typeface="Source Sans Pro" charset="0"/>
-              </a:rPr>
-              <a:t>sleave</a:t>
-            </a:r>
-            <a:r>
-              <a:rPr lang="it-IT" sz="1600" dirty="0" smtClean="0">
-                <a:latin typeface="Source Sans Pro" charset="0"/>
-                <a:ea typeface="Source Sans Pro" charset="0"/>
-                <a:cs typeface="Source Sans Pro" charset="0"/>
-              </a:rPr>
-              <a:t>, ricevute le informazioni sui master presenti nella </a:t>
-            </a:r>
-            <a:r>
-              <a:rPr lang="it-IT" sz="1600" dirty="0" smtClean="0">
-                <a:latin typeface="Source Sans Pro" charset="0"/>
-                <a:ea typeface="Source Sans Pro" charset="0"/>
-                <a:cs typeface="Source Sans Pro" charset="0"/>
-              </a:rPr>
-              <a:t>rete, </a:t>
-            </a:r>
-            <a:r>
-              <a:rPr lang="it-IT" sz="1600" dirty="0" smtClean="0">
-                <a:latin typeface="Source Sans Pro" charset="0"/>
-                <a:ea typeface="Source Sans Pro" charset="0"/>
-                <a:cs typeface="Source Sans Pro" charset="0"/>
-              </a:rPr>
-              <a:t>si da la possibilità all’utente di scegliere il destinatario del file.</a:t>
+              <a:t>, ricevute le informazioni sui master presenti nella rete, si da la possibilità all’utente di scegliere il destinatario del file.</a:t>
             </a:r>
           </a:p>
         </p:txBody>
@@ -25944,12 +25886,28 @@
               <a:t>Nella </a:t>
             </a:r>
             <a:r>
+              <a:rPr lang="it-IT" sz="1600" dirty="0" smtClean="0">
+                <a:latin typeface="Source Sans Pro" charset="0"/>
+                <a:ea typeface="Source Sans Pro" charset="0"/>
+                <a:cs typeface="Source Sans Pro" charset="0"/>
+              </a:rPr>
+              <a:t>slave </a:t>
+            </a:r>
+            <a:r>
+              <a:rPr lang="it-IT" sz="1600" dirty="0" smtClean="0">
+                <a:latin typeface="Source Sans Pro" charset="0"/>
+                <a:ea typeface="Source Sans Pro" charset="0"/>
+                <a:cs typeface="Source Sans Pro" charset="0"/>
+              </a:rPr>
+              <a:t>mode possiamo notare come sia stato inviato l’</a:t>
+            </a:r>
+            <a:r>
               <a:rPr lang="it-IT" sz="1600" dirty="0" err="1" smtClean="0">
                 <a:latin typeface="Source Sans Pro" charset="0"/>
                 <a:ea typeface="Source Sans Pro" charset="0"/>
                 <a:cs typeface="Source Sans Pro" charset="0"/>
               </a:rPr>
-              <a:t>sleave</a:t>
+              <a:t>header</a:t>
             </a:r>
             <a:r>
               <a:rPr lang="it-IT" sz="1600" dirty="0" smtClean="0">
@@ -25957,63 +25915,7 @@
                 <a:ea typeface="Source Sans Pro" charset="0"/>
                 <a:cs typeface="Source Sans Pro" charset="0"/>
               </a:rPr>
-              <a:t> mode possiamo notare come sia stato inviato l’</a:t>
-            </a:r>
-            <a:r>
-              <a:rPr lang="it-IT" sz="1600" dirty="0" err="1" smtClean="0">
-                <a:latin typeface="Source Sans Pro" charset="0"/>
-                <a:ea typeface="Source Sans Pro" charset="0"/>
-                <a:cs typeface="Source Sans Pro" charset="0"/>
-              </a:rPr>
-              <a:t>header</a:t>
-            </a:r>
-            <a:r>
-              <a:rPr lang="it-IT" sz="1600" smtClean="0">
-                <a:latin typeface="Source Sans Pro" charset="0"/>
-                <a:ea typeface="Source Sans Pro" charset="0"/>
-                <a:cs typeface="Source Sans Pro" charset="0"/>
-              </a:rPr>
-              <a:t> </a:t>
-            </a:r>
-            <a:r>
-              <a:rPr lang="it-IT" sz="1600" smtClean="0">
-                <a:latin typeface="Source Sans Pro" charset="0"/>
-                <a:ea typeface="Source Sans Pro" charset="0"/>
-                <a:cs typeface="Source Sans Pro" charset="0"/>
-              </a:rPr>
-              <a:t>contente </a:t>
-            </a:r>
-            <a:r>
-              <a:rPr lang="it-IT" sz="1600" dirty="0" smtClean="0">
-                <a:latin typeface="Source Sans Pro" charset="0"/>
-                <a:ea typeface="Source Sans Pro" charset="0"/>
-                <a:cs typeface="Source Sans Pro" charset="0"/>
-              </a:rPr>
-              <a:t>le informazioni relative al nome utente e al file da inviare, nella master mode</a:t>
-            </a:r>
-            <a:r>
-              <a:rPr lang="it-IT" sz="1600" smtClean="0">
-                <a:latin typeface="Source Sans Pro" charset="0"/>
-                <a:ea typeface="Source Sans Pro" charset="0"/>
-                <a:cs typeface="Source Sans Pro" charset="0"/>
-              </a:rPr>
-              <a:t>, </a:t>
-            </a:r>
-            <a:r>
-              <a:rPr lang="it-IT" sz="1600" smtClean="0">
-                <a:latin typeface="Source Sans Pro" charset="0"/>
-                <a:ea typeface="Source Sans Pro" charset="0"/>
-                <a:cs typeface="Source Sans Pro" charset="0"/>
-              </a:rPr>
-              <a:t>invece, </a:t>
-            </a:r>
-            <a:r>
-              <a:rPr lang="it-IT" sz="1600" dirty="0" smtClean="0">
-                <a:latin typeface="Source Sans Pro" charset="0"/>
-                <a:ea typeface="Source Sans Pro" charset="0"/>
-                <a:cs typeface="Source Sans Pro" charset="0"/>
-              </a:rPr>
-              <a:t>si da la possibilità all’utente di accettare o meno il file.</a:t>
+              <a:t> contente le informazioni relative al nome utente e al file da inviare, nella master mode, invece, si da la possibilità all’utente di accettare o meno il file.</a:t>
             </a:r>
           </a:p>
         </p:txBody>
@@ -34868,11 +34770,7 @@
             </a:pPr>
             <a:r>
               <a:rPr lang="it-IT" dirty="0" smtClean="0"/>
-              <a:t>Motivazioni </a:t>
-            </a:r>
-            <a:r>
-              <a:rPr lang="it-IT" dirty="0" smtClean="0"/>
-              <a:t>e obiettivi del progetto</a:t>
+              <a:t>Motivazioni e obiettivi del progetto</a:t>
             </a:r>
             <a:endParaRPr lang="en" dirty="0"/>
           </a:p>
@@ -35660,31 +35558,7 @@
             </a:pPr>
             <a:r>
               <a:rPr lang="it-IT" sz="2600" dirty="0" smtClean="0"/>
-              <a:t>Quante volte </a:t>
-            </a:r>
-            <a:r>
-              <a:rPr lang="it-IT" sz="2600" dirty="0" smtClean="0"/>
-              <a:t>capita, </a:t>
-            </a:r>
-            <a:r>
-              <a:rPr lang="it-IT" sz="2600" dirty="0" smtClean="0"/>
-              <a:t>in casa o in </a:t>
-            </a:r>
-            <a:r>
-              <a:rPr lang="it-IT" sz="2600" dirty="0" smtClean="0"/>
-              <a:t>ufficio, </a:t>
-            </a:r>
-            <a:r>
-              <a:rPr lang="it-IT" sz="2600" dirty="0" smtClean="0"/>
-              <a:t>di </a:t>
-            </a:r>
-            <a:r>
-              <a:rPr lang="it-IT" sz="2600" dirty="0" smtClean="0"/>
-              <a:t>dover </a:t>
-            </a:r>
-            <a:r>
-              <a:rPr lang="it-IT" sz="2600" dirty="0" smtClean="0"/>
-              <a:t>inviare dei file da un computer all’altro?</a:t>
+              <a:t>Quante volte capita, in casa o in ufficio, di dover inviare dei file da un computer all’altro?</a:t>
             </a:r>
           </a:p>
         </p:txBody>
@@ -36022,15 +35896,7 @@
             </a:pPr>
             <a:r>
               <a:rPr lang="it-IT" dirty="0" smtClean="0"/>
-              <a:t>Sviluppare </a:t>
-            </a:r>
-            <a:r>
-              <a:rPr lang="it-IT" dirty="0" smtClean="0"/>
-              <a:t>un’ </a:t>
-            </a:r>
-            <a:r>
-              <a:rPr lang="it-IT" dirty="0" smtClean="0"/>
-              <a:t>applicazione che permetta lo scambio di file tramite la rete locale</a:t>
+              <a:t>Sviluppare un’ applicazione che permetta lo scambio di file tramite la rete locale</a:t>
             </a:r>
           </a:p>
           <a:p>
@@ -38186,8 +38052,8 @@
               <a:buNone/>
             </a:pPr>
             <a:r>
-              <a:rPr lang="it-IT" b="1" dirty="0" err="1" smtClean="0"/>
-              <a:t>Sleave</a:t>
+              <a:rPr lang="it-IT" b="1" dirty="0" smtClean="0"/>
+              <a:t>Slave</a:t>
             </a:r>
             <a:endParaRPr lang="en" b="1" dirty="0"/>
           </a:p>
@@ -38280,8 +38146,8 @@
               <a:t> </a:t>
             </a:r>
             <a:r>
-              <a:rPr lang="en" sz="2000" dirty="0" err="1" smtClean="0"/>
-              <a:t>sleave</a:t>
+              <a:rPr lang="en" sz="2000" dirty="0" smtClean="0"/>
+              <a:t>slave</a:t>
             </a:r>
             <a:r>
               <a:rPr lang="it-IT" sz="2000" dirty="0" smtClean="0"/>

</xml_diff>